<commit_message>
Last Update 19-06-2019 15:29:59.85
</commit_message>
<xml_diff>
--- a/Slides/Unit 1/CS8392-U1-8-DataTypes_Variables_Constants.pptx
+++ b/Slides/Unit 1/CS8392-U1-8-DataTypes_Variables_Constants.pptx
@@ -208,7 +208,7 @@
             <a:fld id="{9515075B-F3F0-4441-A1BD-B7B515B708FF}" type="datetimeFigureOut">
               <a:rPr lang="en-US" smtClean="0"/>
               <a:pPr/>
-              <a:t>7/11/2018</a:t>
+              <a:t>6/19/2019</a:t>
             </a:fld>
             <a:endParaRPr lang="en-US"/>
           </a:p>
@@ -745,7 +745,7 @@
             <a:fld id="{6E658DF8-B8C0-4C7F-85EB-B53A2DDD44A9}" type="datetimeFigureOut">
               <a:rPr lang="en-US" smtClean="0"/>
               <a:pPr/>
-              <a:t>7/11/2018</a:t>
+              <a:t>6/19/2019</a:t>
             </a:fld>
             <a:endParaRPr lang="en-US"/>
           </a:p>
@@ -912,7 +912,7 @@
             <a:fld id="{6E658DF8-B8C0-4C7F-85EB-B53A2DDD44A9}" type="datetimeFigureOut">
               <a:rPr lang="en-US" smtClean="0"/>
               <a:pPr/>
-              <a:t>7/11/2018</a:t>
+              <a:t>6/19/2019</a:t>
             </a:fld>
             <a:endParaRPr lang="en-US"/>
           </a:p>
@@ -1089,7 +1089,7 @@
             <a:fld id="{6E658DF8-B8C0-4C7F-85EB-B53A2DDD44A9}" type="datetimeFigureOut">
               <a:rPr lang="en-US" smtClean="0"/>
               <a:pPr/>
-              <a:t>7/11/2018</a:t>
+              <a:t>6/19/2019</a:t>
             </a:fld>
             <a:endParaRPr lang="en-US"/>
           </a:p>
@@ -1288,7 +1288,7 @@
             <a:fld id="{6E658DF8-B8C0-4C7F-85EB-B53A2DDD44A9}" type="datetimeFigureOut">
               <a:rPr lang="en-US" smtClean="0"/>
               <a:pPr/>
-              <a:t>7/11/2018</a:t>
+              <a:t>6/19/2019</a:t>
             </a:fld>
             <a:endParaRPr lang="en-US"/>
           </a:p>
@@ -1531,7 +1531,7 @@
             <a:fld id="{6E658DF8-B8C0-4C7F-85EB-B53A2DDD44A9}" type="datetimeFigureOut">
               <a:rPr lang="en-US" smtClean="0"/>
               <a:pPr/>
-              <a:t>7/11/2018</a:t>
+              <a:t>6/19/2019</a:t>
             </a:fld>
             <a:endParaRPr lang="en-US"/>
           </a:p>
@@ -1816,7 +1816,7 @@
             <a:fld id="{6E658DF8-B8C0-4C7F-85EB-B53A2DDD44A9}" type="datetimeFigureOut">
               <a:rPr lang="en-US" smtClean="0"/>
               <a:pPr/>
-              <a:t>7/11/2018</a:t>
+              <a:t>6/19/2019</a:t>
             </a:fld>
             <a:endParaRPr lang="en-US"/>
           </a:p>
@@ -2235,7 +2235,7 @@
             <a:fld id="{6E658DF8-B8C0-4C7F-85EB-B53A2DDD44A9}" type="datetimeFigureOut">
               <a:rPr lang="en-US" smtClean="0"/>
               <a:pPr/>
-              <a:t>7/11/2018</a:t>
+              <a:t>6/19/2019</a:t>
             </a:fld>
             <a:endParaRPr lang="en-US"/>
           </a:p>
@@ -2350,7 +2350,7 @@
             <a:fld id="{6E658DF8-B8C0-4C7F-85EB-B53A2DDD44A9}" type="datetimeFigureOut">
               <a:rPr lang="en-US" smtClean="0"/>
               <a:pPr/>
-              <a:t>7/11/2018</a:t>
+              <a:t>6/19/2019</a:t>
             </a:fld>
             <a:endParaRPr lang="en-US"/>
           </a:p>
@@ -2442,7 +2442,7 @@
             <a:fld id="{6E658DF8-B8C0-4C7F-85EB-B53A2DDD44A9}" type="datetimeFigureOut">
               <a:rPr lang="en-US" smtClean="0"/>
               <a:pPr/>
-              <a:t>7/11/2018</a:t>
+              <a:t>6/19/2019</a:t>
             </a:fld>
             <a:endParaRPr lang="en-US"/>
           </a:p>
@@ -2716,7 +2716,7 @@
             <a:fld id="{6E658DF8-B8C0-4C7F-85EB-B53A2DDD44A9}" type="datetimeFigureOut">
               <a:rPr lang="en-US" smtClean="0"/>
               <a:pPr/>
-              <a:t>7/11/2018</a:t>
+              <a:t>6/19/2019</a:t>
             </a:fld>
             <a:endParaRPr lang="en-US"/>
           </a:p>
@@ -2966,7 +2966,7 @@
             <a:fld id="{6E658DF8-B8C0-4C7F-85EB-B53A2DDD44A9}" type="datetimeFigureOut">
               <a:rPr lang="en-US" smtClean="0"/>
               <a:pPr/>
-              <a:t>7/11/2018</a:t>
+              <a:t>6/19/2019</a:t>
             </a:fld>
             <a:endParaRPr lang="en-US"/>
           </a:p>
@@ -3182,7 +3182,7 @@
             <a:fld id="{6E658DF8-B8C0-4C7F-85EB-B53A2DDD44A9}" type="datetimeFigureOut">
               <a:rPr lang="en-US" smtClean="0"/>
               <a:pPr/>
-              <a:t>7/11/2018</a:t>
+              <a:t>6/19/2019</a:t>
             </a:fld>
             <a:endParaRPr lang="en-US"/>
           </a:p>
@@ -3577,11 +3577,7 @@
           <a:p>
             <a:r>
               <a:rPr lang="en-US" dirty="0" smtClean="0"/>
-              <a:t>Fundamentals</a:t>
-            </a:r>
-            <a:r>
-              <a:rPr lang="en-US" dirty="0" smtClean="0"/>
-              <a:t> - 1</a:t>
+              <a:t>Fundamentals - 1</a:t>
             </a:r>
             <a:endParaRPr lang="en-US" dirty="0"/>
           </a:p>
@@ -5853,10 +5849,10 @@
           <a:p>
             <a:pPr algn="ctr"/>
             <a:r>
-              <a:rPr lang="en-US" err="1" smtClean="0"/>
-              <a:t>bool</a:t>
-            </a:r>
-            <a:endParaRPr lang="en-US"/>
+              <a:rPr lang="en-US" dirty="0" err="1" smtClean="0"/>
+              <a:t>boolean</a:t>
+            </a:r>
+            <a:endParaRPr lang="en-US" dirty="0"/>
           </a:p>
         </p:txBody>
       </p:sp>

</xml_diff>